<commit_message>
Added poster and presentation source files
</commit_message>
<xml_diff>
--- a/docs/presentation_9-4/rocnikovy_projekt_RHEED_prezentace.pptx
+++ b/docs/presentation_9-4/rocnikovy_projekt_RHEED_prezentace.pptx
@@ -5,20 +5,21 @@
     <p:sldMasterId id="2147483648" r:id="rId1"/>
   </p:sldMasterIdLst>
   <p:notesMasterIdLst>
-    <p:notesMasterId r:id="rId13"/>
+    <p:notesMasterId r:id="rId14"/>
   </p:notesMasterIdLst>
   <p:sldIdLst>
     <p:sldId id="256" r:id="rId2"/>
     <p:sldId id="257" r:id="rId3"/>
-    <p:sldId id="272" r:id="rId4"/>
-    <p:sldId id="258" r:id="rId5"/>
-    <p:sldId id="261" r:id="rId6"/>
-    <p:sldId id="262" r:id="rId7"/>
-    <p:sldId id="263" r:id="rId8"/>
-    <p:sldId id="264" r:id="rId9"/>
+    <p:sldId id="258" r:id="rId4"/>
+    <p:sldId id="261" r:id="rId5"/>
+    <p:sldId id="262" r:id="rId6"/>
+    <p:sldId id="263" r:id="rId7"/>
+    <p:sldId id="264" r:id="rId8"/>
+    <p:sldId id="272" r:id="rId9"/>
     <p:sldId id="266" r:id="rId10"/>
-    <p:sldId id="271" r:id="rId11"/>
-    <p:sldId id="269" r:id="rId12"/>
+    <p:sldId id="273" r:id="rId11"/>
+    <p:sldId id="271" r:id="rId12"/>
+    <p:sldId id="269" r:id="rId13"/>
   </p:sldIdLst>
   <p:sldSz cx="12192000" cy="6858000"/>
   <p:notesSz cx="6858000" cy="9144000"/>
@@ -539,7 +540,7 @@
           <a:p>
             <a:fld id="{70B2E99A-C8DC-ED4F-A7A7-1DDE5D250590}" type="slidenum">
               <a:rPr lang="cs-CZ" smtClean="0"/>
-              <a:t>4</a:t>
+              <a:t>3</a:t>
             </a:fld>
             <a:endParaRPr lang="cs-CZ"/>
           </a:p>
@@ -647,7 +648,7 @@
           <a:p>
             <a:fld id="{70B2E99A-C8DC-ED4F-A7A7-1DDE5D250590}" type="slidenum">
               <a:rPr lang="cs-CZ" smtClean="0"/>
-              <a:t>5</a:t>
+              <a:t>4</a:t>
             </a:fld>
             <a:endParaRPr lang="cs-CZ"/>
           </a:p>
@@ -755,7 +756,7 @@
           <a:p>
             <a:fld id="{70B2E99A-C8DC-ED4F-A7A7-1DDE5D250590}" type="slidenum">
               <a:rPr lang="cs-CZ" smtClean="0"/>
-              <a:t>6</a:t>
+              <a:t>5</a:t>
             </a:fld>
             <a:endParaRPr lang="cs-CZ"/>
           </a:p>
@@ -4448,6 +4449,183 @@
         <p:cNvPr id="1" name="">
           <a:extLst>
             <a:ext uri="{FF2B5EF4-FFF2-40B4-BE49-F238E27FC236}">
+              <a16:creationId xmlns:a16="http://schemas.microsoft.com/office/drawing/2014/main" id="{495DFAE3-94CE-91EC-F822-2892E0865B71}"/>
+            </a:ext>
+          </a:extLst>
+        </p:cNvPr>
+        <p:cNvGrpSpPr/>
+        <p:nvPr/>
+      </p:nvGrpSpPr>
+      <p:grpSpPr>
+        <a:xfrm>
+          <a:off x="0" y="0"/>
+          <a:ext cx="0" cy="0"/>
+          <a:chOff x="0" y="0"/>
+          <a:chExt cx="0" cy="0"/>
+        </a:xfrm>
+      </p:grpSpPr>
+      <p:sp>
+        <p:nvSpPr>
+          <p:cNvPr id="2" name="Nadpis 1">
+            <a:extLst>
+              <a:ext uri="{FF2B5EF4-FFF2-40B4-BE49-F238E27FC236}">
+                <a16:creationId xmlns:a16="http://schemas.microsoft.com/office/drawing/2014/main" id="{9C9907DC-C4C6-5398-3CDA-D9FCDE4E4C62}"/>
+              </a:ext>
+            </a:extLst>
+          </p:cNvPr>
+          <p:cNvSpPr>
+            <a:spLocks noGrp="1"/>
+          </p:cNvSpPr>
+          <p:nvPr>
+            <p:ph type="title"/>
+          </p:nvPr>
+        </p:nvSpPr>
+        <p:spPr/>
+        <p:txBody>
+          <a:bodyPr/>
+          <a:lstStyle/>
+          <a:p>
+            <a:endParaRPr lang="cs-CZ" dirty="0"/>
+          </a:p>
+        </p:txBody>
+      </p:sp>
+      <p:sp>
+        <p:nvSpPr>
+          <p:cNvPr id="3" name="Zástupný obsah 2">
+            <a:extLst>
+              <a:ext uri="{FF2B5EF4-FFF2-40B4-BE49-F238E27FC236}">
+                <a16:creationId xmlns:a16="http://schemas.microsoft.com/office/drawing/2014/main" id="{CB5A41B0-47F3-8B07-C7EE-557AC59BD60E}"/>
+              </a:ext>
+            </a:extLst>
+          </p:cNvPr>
+          <p:cNvSpPr>
+            <a:spLocks noGrp="1"/>
+          </p:cNvSpPr>
+          <p:nvPr>
+            <p:ph idx="1"/>
+          </p:nvPr>
+        </p:nvSpPr>
+        <p:spPr/>
+        <p:txBody>
+          <a:bodyPr/>
+          <a:lstStyle/>
+          <a:p>
+            <a:endParaRPr lang="cs-CZ" dirty="0"/>
+          </a:p>
+        </p:txBody>
+      </p:sp>
+      <p:sp>
+        <p:nvSpPr>
+          <p:cNvPr id="4" name="Zástupný symbol pro číslo snímku 3">
+            <a:extLst>
+              <a:ext uri="{FF2B5EF4-FFF2-40B4-BE49-F238E27FC236}">
+                <a16:creationId xmlns:a16="http://schemas.microsoft.com/office/drawing/2014/main" id="{FE8A8811-3FE5-A881-D554-1FDBEA59C6EA}"/>
+              </a:ext>
+            </a:extLst>
+          </p:cNvPr>
+          <p:cNvSpPr>
+            <a:spLocks noGrp="1"/>
+          </p:cNvSpPr>
+          <p:nvPr>
+            <p:ph type="sldNum" sz="quarter" idx="12"/>
+          </p:nvPr>
+        </p:nvSpPr>
+        <p:spPr/>
+        <p:txBody>
+          <a:bodyPr/>
+          <a:lstStyle/>
+          <a:p>
+            <a:fld id="{DA6B2738-7FCF-B04D-A8FF-72053771C37B}" type="slidenum">
+              <a:rPr lang="cs-CZ" smtClean="0"/>
+              <a:t>10</a:t>
+            </a:fld>
+            <a:endParaRPr lang="cs-CZ"/>
+          </a:p>
+        </p:txBody>
+      </p:sp>
+      <p:sp>
+        <p:nvSpPr>
+          <p:cNvPr id="6" name="TextovéPole 5">
+            <a:extLst>
+              <a:ext uri="{FF2B5EF4-FFF2-40B4-BE49-F238E27FC236}">
+                <a16:creationId xmlns:a16="http://schemas.microsoft.com/office/drawing/2014/main" id="{D5384DDF-B7A7-8D50-B6C8-3489211743C3}"/>
+              </a:ext>
+            </a:extLst>
+          </p:cNvPr>
+          <p:cNvSpPr txBox="1"/>
+          <p:nvPr/>
+        </p:nvSpPr>
+        <p:spPr>
+          <a:xfrm>
+            <a:off x="3050005" y="3244334"/>
+            <a:ext cx="6100010" cy="369332"/>
+          </a:xfrm>
+          <a:prstGeom prst="rect">
+            <a:avLst/>
+          </a:prstGeom>
+          <a:noFill/>
+        </p:spPr>
+        <p:txBody>
+          <a:bodyPr wrap="square">
+            <a:spAutoFit/>
+          </a:bodyPr>
+          <a:lstStyle/>
+          <a:p>
+            <a:endParaRPr lang="cs-CZ" dirty="0"/>
+          </a:p>
+        </p:txBody>
+      </p:sp>
+      <p:pic>
+        <p:nvPicPr>
+          <p:cNvPr id="7" name="Obrázek 6">
+            <a:extLst>
+              <a:ext uri="{FF2B5EF4-FFF2-40B4-BE49-F238E27FC236}">
+                <a16:creationId xmlns:a16="http://schemas.microsoft.com/office/drawing/2014/main" id="{BBEDFA75-A3FB-A16D-5A10-B551B5D716FA}"/>
+              </a:ext>
+            </a:extLst>
+          </p:cNvPr>
+          <p:cNvPicPr>
+            <a:picLocks noChangeAspect="1"/>
+          </p:cNvPicPr>
+          <p:nvPr/>
+        </p:nvPicPr>
+        <p:blipFill>
+          <a:blip r:embed="rId2"/>
+          <a:stretch>
+            <a:fillRect/>
+          </a:stretch>
+        </p:blipFill>
+        <p:spPr>
+          <a:xfrm>
+            <a:off x="193961" y="654553"/>
+            <a:ext cx="11790219" cy="5386325"/>
+          </a:xfrm>
+          <a:prstGeom prst="rect">
+            <a:avLst/>
+          </a:prstGeom>
+        </p:spPr>
+      </p:pic>
+    </p:spTree>
+    <p:extLst>
+      <p:ext uri="{BB962C8B-B14F-4D97-AF65-F5344CB8AC3E}">
+        <p14:creationId xmlns:p14="http://schemas.microsoft.com/office/powerpoint/2010/main" val="506574734"/>
+      </p:ext>
+    </p:extLst>
+  </p:cSld>
+  <p:clrMapOvr>
+    <a:masterClrMapping/>
+  </p:clrMapOvr>
+</p:sld>
+</file>
+
+<file path=ppt/slides/slide11.xml><?xml version="1.0" encoding="utf-8"?>
+<p:sld xmlns:a="http://schemas.openxmlformats.org/drawingml/2006/main" xmlns:r="http://schemas.openxmlformats.org/officeDocument/2006/relationships" xmlns:p="http://schemas.openxmlformats.org/presentationml/2006/main">
+  <p:cSld>
+    <p:spTree>
+      <p:nvGrpSpPr>
+        <p:cNvPr id="1" name="">
+          <a:extLst>
+            <a:ext uri="{FF2B5EF4-FFF2-40B4-BE49-F238E27FC236}">
               <a16:creationId xmlns:a16="http://schemas.microsoft.com/office/drawing/2014/main" id="{83BEBB4A-7B49-75B4-8F94-4499A6F42926}"/>
             </a:ext>
           </a:extLst>
@@ -4735,7 +4913,7 @@
                 <a:ea typeface="Helvetica Neue" panose="02000503000000020004" pitchFamily="2" charset="0"/>
                 <a:cs typeface="Helvetica Neue" panose="02000503000000020004" pitchFamily="2" charset="0"/>
               </a:rPr>
-              <a:t>10</a:t>
+              <a:t>11</a:t>
             </a:fld>
             <a:endParaRPr lang="cs-CZ" sz="1400" b="1" dirty="0">
               <a:solidFill>
@@ -4763,7 +4941,7 @@
 </p:sld>
 </file>
 
-<file path=ppt/slides/slide11.xml><?xml version="1.0" encoding="utf-8"?>
+<file path=ppt/slides/slide12.xml><?xml version="1.0" encoding="utf-8"?>
 <p:sld xmlns:a="http://schemas.openxmlformats.org/drawingml/2006/main" xmlns:r="http://schemas.openxmlformats.org/officeDocument/2006/relationships" xmlns:p="http://schemas.openxmlformats.org/presentationml/2006/main">
   <p:cSld>
     <p:spTree>
@@ -4913,7 +5091,7 @@
                 <a:ea typeface="Helvetica Neue" panose="02000503000000020004" pitchFamily="2" charset="0"/>
                 <a:cs typeface="Helvetica Neue" panose="02000503000000020004" pitchFamily="2" charset="0"/>
               </a:rPr>
-              <a:t>11</a:t>
+              <a:t>12</a:t>
             </a:fld>
             <a:endParaRPr lang="cs-CZ" sz="1400" b="1" dirty="0">
               <a:solidFill>
@@ -5251,306 +5429,6 @@
 </file>
 
 <file path=ppt/slides/slide3.xml><?xml version="1.0" encoding="utf-8"?>
-<p:sld xmlns:a="http://schemas.openxmlformats.org/drawingml/2006/main" xmlns:r="http://schemas.openxmlformats.org/officeDocument/2006/relationships" xmlns:p="http://schemas.openxmlformats.org/presentationml/2006/main">
-  <p:cSld>
-    <p:spTree>
-      <p:nvGrpSpPr>
-        <p:cNvPr id="1" name="">
-          <a:extLst>
-            <a:ext uri="{FF2B5EF4-FFF2-40B4-BE49-F238E27FC236}">
-              <a16:creationId xmlns:a16="http://schemas.microsoft.com/office/drawing/2014/main" id="{36AACE61-1FD6-E6C2-212C-BE6918846B69}"/>
-            </a:ext>
-          </a:extLst>
-        </p:cNvPr>
-        <p:cNvGrpSpPr/>
-        <p:nvPr/>
-      </p:nvGrpSpPr>
-      <p:grpSpPr>
-        <a:xfrm>
-          <a:off x="0" y="0"/>
-          <a:ext cx="0" cy="0"/>
-          <a:chOff x="0" y="0"/>
-          <a:chExt cx="0" cy="0"/>
-        </a:xfrm>
-      </p:grpSpPr>
-      <p:sp>
-        <p:nvSpPr>
-          <p:cNvPr id="2" name="Nadpis 1">
-            <a:extLst>
-              <a:ext uri="{FF2B5EF4-FFF2-40B4-BE49-F238E27FC236}">
-                <a16:creationId xmlns:a16="http://schemas.microsoft.com/office/drawing/2014/main" id="{0030540E-28B0-6697-F10C-A6082A45F8E6}"/>
-              </a:ext>
-            </a:extLst>
-          </p:cNvPr>
-          <p:cNvSpPr>
-            <a:spLocks noGrp="1"/>
-          </p:cNvSpPr>
-          <p:nvPr>
-            <p:ph type="title"/>
-          </p:nvPr>
-        </p:nvSpPr>
-        <p:spPr>
-          <a:xfrm>
-            <a:off x="473503" y="163295"/>
-            <a:ext cx="10515600" cy="1325563"/>
-          </a:xfrm>
-        </p:spPr>
-        <p:txBody>
-          <a:bodyPr/>
-          <a:lstStyle/>
-          <a:p>
-            <a:r>
-              <a:rPr lang="cs-CZ" b="1" dirty="0">
-                <a:solidFill>
-                  <a:schemeClr val="tx2">
-                    <a:lumMod val="90000"/>
-                    <a:lumOff val="10000"/>
-                  </a:schemeClr>
-                </a:solidFill>
-                <a:latin typeface="Helvetica Neue" panose="02000503000000020004" pitchFamily="2" charset="0"/>
-                <a:ea typeface="Helvetica Neue" panose="02000503000000020004" pitchFamily="2" charset="0"/>
-                <a:cs typeface="Helvetica Neue" panose="02000503000000020004" pitchFamily="2" charset="0"/>
-              </a:rPr>
-              <a:t>Cíle práce</a:t>
-            </a:r>
-          </a:p>
-        </p:txBody>
-      </p:sp>
-      <p:sp>
-        <p:nvSpPr>
-          <p:cNvPr id="3" name="Zástupný obsah 2">
-            <a:extLst>
-              <a:ext uri="{FF2B5EF4-FFF2-40B4-BE49-F238E27FC236}">
-                <a16:creationId xmlns:a16="http://schemas.microsoft.com/office/drawing/2014/main" id="{0DC4F4E2-22B0-9B4E-BF7C-48E8B33FCABC}"/>
-              </a:ext>
-            </a:extLst>
-          </p:cNvPr>
-          <p:cNvSpPr>
-            <a:spLocks noGrp="1"/>
-          </p:cNvSpPr>
-          <p:nvPr>
-            <p:ph idx="1"/>
-          </p:nvPr>
-        </p:nvSpPr>
-        <p:spPr>
-          <a:xfrm>
-            <a:off x="838200" y="1462289"/>
-            <a:ext cx="10515600" cy="4351338"/>
-          </a:xfrm>
-        </p:spPr>
-        <p:txBody>
-          <a:bodyPr>
-            <a:normAutofit/>
-          </a:bodyPr>
-          <a:lstStyle/>
-          <a:p>
-            <a:pPr marL="514350" indent="-514350">
-              <a:buFont typeface="+mj-lt"/>
-              <a:buAutoNum type="arabicPeriod"/>
-            </a:pPr>
-            <a:r>
-              <a:rPr lang="cs-CZ" sz="2000" b="1" dirty="0"/>
-              <a:t>Vyvinout aplikaci pro RHEED analýzu v reálném čase, která by byla nezávislá na výrobci systému RHEED nebo na kameře</a:t>
-            </a:r>
-          </a:p>
-          <a:p>
-            <a:pPr marL="514350" indent="-514350">
-              <a:buFont typeface="+mj-lt"/>
-              <a:buAutoNum type="arabicPeriod"/>
-            </a:pPr>
-            <a:r>
-              <a:rPr lang="cs-CZ" sz="2000" b="1" dirty="0"/>
-              <a:t>Přívětivé GUI</a:t>
-            </a:r>
-          </a:p>
-          <a:p>
-            <a:pPr marL="514350" indent="-514350">
-              <a:buFont typeface="+mj-lt"/>
-              <a:buAutoNum type="arabicPeriod"/>
-            </a:pPr>
-            <a:r>
-              <a:rPr lang="cs-CZ" sz="2000" b="1" dirty="0"/>
-              <a:t>Umožnit jednoduchou rozšiřitelnost aplikace </a:t>
-            </a:r>
-            <a:r>
-              <a:rPr lang="cs-CZ" sz="2000" dirty="0"/>
-              <a:t>=&gt; dobrá dokumentace kódu</a:t>
-            </a:r>
-          </a:p>
-          <a:p>
-            <a:pPr marL="514350" indent="-514350">
-              <a:buFont typeface="+mj-lt"/>
-              <a:buAutoNum type="arabicPeriod"/>
-            </a:pPr>
-            <a:endParaRPr lang="cs-CZ" sz="2000" dirty="0"/>
-          </a:p>
-          <a:p>
-            <a:pPr marL="514350" indent="-514350">
-              <a:buFont typeface="+mj-lt"/>
-              <a:buAutoNum type="arabicPeriod"/>
-            </a:pPr>
-            <a:endParaRPr lang="cs-CZ" sz="2000" dirty="0"/>
-          </a:p>
-          <a:p>
-            <a:pPr marL="514350" indent="-514350">
-              <a:buFont typeface="+mj-lt"/>
-              <a:buAutoNum type="arabicPeriod"/>
-            </a:pPr>
-            <a:endParaRPr lang="cs-CZ" sz="2000" dirty="0"/>
-          </a:p>
-          <a:p>
-            <a:pPr marL="514350" indent="-514350">
-              <a:buFont typeface="+mj-lt"/>
-              <a:buAutoNum type="arabicPeriod"/>
-            </a:pPr>
-            <a:endParaRPr lang="cs-CZ" sz="2000" dirty="0"/>
-          </a:p>
-          <a:p>
-            <a:pPr marL="514350" indent="-514350">
-              <a:buFont typeface="+mj-lt"/>
-              <a:buAutoNum type="arabicPeriod"/>
-            </a:pPr>
-            <a:endParaRPr lang="cs-CZ" sz="2000" dirty="0"/>
-          </a:p>
-          <a:p>
-            <a:pPr marL="514350" indent="-514350">
-              <a:buFont typeface="+mj-lt"/>
-              <a:buAutoNum type="arabicPeriod"/>
-            </a:pPr>
-            <a:endParaRPr lang="cs-CZ" sz="2000" dirty="0"/>
-          </a:p>
-          <a:p>
-            <a:pPr marL="0" indent="0">
-              <a:buNone/>
-            </a:pPr>
-            <a:r>
-              <a:rPr lang="cs-CZ" sz="2000" dirty="0"/>
-              <a:t>Většinu požadavků jsme monitorovali skrze </a:t>
-            </a:r>
-            <a:r>
-              <a:rPr lang="cs-CZ" sz="2000" b="1" dirty="0" err="1"/>
-              <a:t>issues</a:t>
-            </a:r>
-            <a:r>
-              <a:rPr lang="cs-CZ" sz="2000" dirty="0"/>
-              <a:t> na GitHubu</a:t>
-            </a:r>
-          </a:p>
-        </p:txBody>
-      </p:sp>
-      <p:pic>
-        <p:nvPicPr>
-          <p:cNvPr id="5" name="Picture 8" descr="Fyzikální ústav AV ČR, v.v.i. | Přehled institucí | Transfera.cz">
-            <a:extLst>
-              <a:ext uri="{FF2B5EF4-FFF2-40B4-BE49-F238E27FC236}">
-                <a16:creationId xmlns:a16="http://schemas.microsoft.com/office/drawing/2014/main" id="{CA78B188-3EDB-505C-F56F-ED8C2C574670}"/>
-              </a:ext>
-            </a:extLst>
-          </p:cNvPr>
-          <p:cNvPicPr>
-            <a:picLocks noChangeAspect="1" noChangeArrowheads="1"/>
-          </p:cNvPicPr>
-          <p:nvPr/>
-        </p:nvPicPr>
-        <p:blipFill>
-          <a:blip r:embed="rId2">
-            <a:extLst>
-              <a:ext uri="{28A0092B-C50C-407E-A947-70E740481C1C}">
-                <a14:useLocalDpi xmlns:a14="http://schemas.microsoft.com/office/drawing/2010/main" val="0"/>
-              </a:ext>
-            </a:extLst>
-          </a:blip>
-          <a:srcRect/>
-          <a:stretch>
-            <a:fillRect/>
-          </a:stretch>
-        </p:blipFill>
-        <p:spPr bwMode="auto">
-          <a:xfrm>
-            <a:off x="268965" y="5973827"/>
-            <a:ext cx="2329009" cy="592909"/>
-          </a:xfrm>
-          <a:prstGeom prst="rect">
-            <a:avLst/>
-          </a:prstGeom>
-          <a:noFill/>
-          <a:extLst>
-            <a:ext uri="{909E8E84-426E-40DD-AFC4-6F175D3DCCD1}">
-              <a14:hiddenFill xmlns:a14="http://schemas.microsoft.com/office/drawing/2010/main">
-                <a:solidFill>
-                  <a:srgbClr val="FFFFFF"/>
-                </a:solidFill>
-              </a14:hiddenFill>
-            </a:ext>
-          </a:extLst>
-        </p:spPr>
-      </p:pic>
-      <p:sp>
-        <p:nvSpPr>
-          <p:cNvPr id="6" name="Zástupný symbol pro číslo snímku 5">
-            <a:extLst>
-              <a:ext uri="{FF2B5EF4-FFF2-40B4-BE49-F238E27FC236}">
-                <a16:creationId xmlns:a16="http://schemas.microsoft.com/office/drawing/2014/main" id="{E223E3FB-CB8A-3B34-0878-139C622D2092}"/>
-              </a:ext>
-            </a:extLst>
-          </p:cNvPr>
-          <p:cNvSpPr>
-            <a:spLocks noGrp="1"/>
-          </p:cNvSpPr>
-          <p:nvPr>
-            <p:ph type="sldNum" sz="quarter" idx="12"/>
-          </p:nvPr>
-        </p:nvSpPr>
-        <p:spPr>
-          <a:xfrm>
-            <a:off x="9059518" y="6259095"/>
-            <a:ext cx="2743200" cy="365125"/>
-          </a:xfrm>
-        </p:spPr>
-        <p:txBody>
-          <a:bodyPr/>
-          <a:lstStyle/>
-          <a:p>
-            <a:fld id="{DA6B2738-7FCF-B04D-A8FF-72053771C37B}" type="slidenum">
-              <a:rPr lang="cs-CZ" sz="1400" b="1" smtClean="0">
-                <a:solidFill>
-                  <a:schemeClr val="accent4">
-                    <a:lumMod val="50000"/>
-                  </a:schemeClr>
-                </a:solidFill>
-                <a:latin typeface="Helvetica Neue" panose="02000503000000020004" pitchFamily="2" charset="0"/>
-                <a:ea typeface="Helvetica Neue" panose="02000503000000020004" pitchFamily="2" charset="0"/>
-                <a:cs typeface="Helvetica Neue" panose="02000503000000020004" pitchFamily="2" charset="0"/>
-              </a:rPr>
-              <a:t>3</a:t>
-            </a:fld>
-            <a:endParaRPr lang="cs-CZ" sz="1400" b="1" dirty="0">
-              <a:solidFill>
-                <a:schemeClr val="accent4">
-                  <a:lumMod val="50000"/>
-                </a:schemeClr>
-              </a:solidFill>
-              <a:latin typeface="Helvetica Neue" panose="02000503000000020004" pitchFamily="2" charset="0"/>
-              <a:ea typeface="Helvetica Neue" panose="02000503000000020004" pitchFamily="2" charset="0"/>
-              <a:cs typeface="Helvetica Neue" panose="02000503000000020004" pitchFamily="2" charset="0"/>
-            </a:endParaRPr>
-          </a:p>
-        </p:txBody>
-      </p:sp>
-    </p:spTree>
-    <p:extLst>
-      <p:ext uri="{BB962C8B-B14F-4D97-AF65-F5344CB8AC3E}">
-        <p14:creationId xmlns:p14="http://schemas.microsoft.com/office/powerpoint/2010/main" val="1693630378"/>
-      </p:ext>
-    </p:extLst>
-  </p:cSld>
-  <p:clrMapOvr>
-    <a:masterClrMapping/>
-  </p:clrMapOvr>
-</p:sld>
-</file>
-
-<file path=ppt/slides/slide4.xml><?xml version="1.0" encoding="utf-8"?>
 <p:sld xmlns:a="http://schemas.openxmlformats.org/drawingml/2006/main" xmlns:r="http://schemas.openxmlformats.org/officeDocument/2006/relationships" xmlns:p="http://schemas.openxmlformats.org/presentationml/2006/main">
   <p:cSld>
     <p:bg>
@@ -5825,7 +5703,7 @@
                   <a:spcPts val="600"/>
                 </a:spcAft>
               </a:pPr>
-              <a:t>4</a:t>
+              <a:t>3</a:t>
             </a:fld>
             <a:endParaRPr lang="en-US" b="1">
               <a:solidFill>
@@ -5848,7 +5726,7 @@
 </p:sld>
 </file>
 
-<file path=ppt/slides/slide5.xml><?xml version="1.0" encoding="utf-8"?>
+<file path=ppt/slides/slide4.xml><?xml version="1.0" encoding="utf-8"?>
 <p:sld xmlns:a="http://schemas.openxmlformats.org/drawingml/2006/main" xmlns:r="http://schemas.openxmlformats.org/officeDocument/2006/relationships" xmlns:p="http://schemas.openxmlformats.org/presentationml/2006/main">
   <p:cSld>
     <p:spTree>
@@ -5955,7 +5833,7 @@
                 <a:ea typeface="Helvetica Neue" panose="02000503000000020004" pitchFamily="2" charset="0"/>
                 <a:cs typeface="Helvetica Neue" panose="02000503000000020004" pitchFamily="2" charset="0"/>
               </a:rPr>
-              <a:t>5</a:t>
+              <a:t>4</a:t>
             </a:fld>
             <a:endParaRPr lang="cs-CZ" sz="1400" b="1" dirty="0">
               <a:solidFill>
@@ -6030,7 +5908,7 @@
 </p:sld>
 </file>
 
-<file path=ppt/slides/slide6.xml><?xml version="1.0" encoding="utf-8"?>
+<file path=ppt/slides/slide5.xml><?xml version="1.0" encoding="utf-8"?>
 <p:sld xmlns:a="http://schemas.openxmlformats.org/drawingml/2006/main" xmlns:r="http://schemas.openxmlformats.org/officeDocument/2006/relationships" xmlns:p="http://schemas.openxmlformats.org/presentationml/2006/main">
   <p:cSld>
     <p:spTree>
@@ -6137,7 +6015,7 @@
                 <a:ea typeface="Helvetica Neue" panose="02000503000000020004" pitchFamily="2" charset="0"/>
                 <a:cs typeface="Helvetica Neue" panose="02000503000000020004" pitchFamily="2" charset="0"/>
               </a:rPr>
-              <a:t>6</a:t>
+              <a:t>5</a:t>
             </a:fld>
             <a:endParaRPr lang="cs-CZ" sz="1400" b="1" dirty="0">
               <a:solidFill>
@@ -6212,7 +6090,7 @@
 </p:sld>
 </file>
 
-<file path=ppt/slides/slide7.xml><?xml version="1.0" encoding="utf-8"?>
+<file path=ppt/slides/slide6.xml><?xml version="1.0" encoding="utf-8"?>
 <p:sld xmlns:a="http://schemas.openxmlformats.org/drawingml/2006/main" xmlns:r="http://schemas.openxmlformats.org/officeDocument/2006/relationships" xmlns:p="http://schemas.openxmlformats.org/presentationml/2006/main">
   <p:cSld>
     <p:spTree>
@@ -6302,7 +6180,7 @@
           <a:p>
             <a:fld id="{DA6B2738-7FCF-B04D-A8FF-72053771C37B}" type="slidenum">
               <a:rPr lang="cs-CZ" smtClean="0"/>
-              <a:t>7</a:t>
+              <a:t>6</a:t>
             </a:fld>
             <a:endParaRPr lang="cs-CZ"/>
           </a:p>
@@ -6368,7 +6246,7 @@
 </p:sld>
 </file>
 
-<file path=ppt/slides/slide8.xml><?xml version="1.0" encoding="utf-8"?>
+<file path=ppt/slides/slide7.xml><?xml version="1.0" encoding="utf-8"?>
 <p:sld xmlns:a="http://schemas.openxmlformats.org/drawingml/2006/main" xmlns:r="http://schemas.openxmlformats.org/officeDocument/2006/relationships" xmlns:p="http://schemas.openxmlformats.org/presentationml/2006/main">
   <p:cSld>
     <p:spTree>
@@ -6464,7 +6342,7 @@
           <a:p>
             <a:fld id="{DA6B2738-7FCF-B04D-A8FF-72053771C37B}" type="slidenum">
               <a:rPr lang="cs-CZ" smtClean="0"/>
-              <a:t>8</a:t>
+              <a:t>7</a:t>
             </a:fld>
             <a:endParaRPr lang="cs-CZ"/>
           </a:p>
@@ -6521,6 +6399,311 @@
     <p:extLst>
       <p:ext uri="{BB962C8B-B14F-4D97-AF65-F5344CB8AC3E}">
         <p14:creationId xmlns:p14="http://schemas.microsoft.com/office/powerpoint/2010/main" val="1416762843"/>
+      </p:ext>
+    </p:extLst>
+  </p:cSld>
+  <p:clrMapOvr>
+    <a:masterClrMapping/>
+  </p:clrMapOvr>
+</p:sld>
+</file>
+
+<file path=ppt/slides/slide8.xml><?xml version="1.0" encoding="utf-8"?>
+<p:sld xmlns:a="http://schemas.openxmlformats.org/drawingml/2006/main" xmlns:r="http://schemas.openxmlformats.org/officeDocument/2006/relationships" xmlns:p="http://schemas.openxmlformats.org/presentationml/2006/main">
+  <p:cSld>
+    <p:spTree>
+      <p:nvGrpSpPr>
+        <p:cNvPr id="1" name="">
+          <a:extLst>
+            <a:ext uri="{FF2B5EF4-FFF2-40B4-BE49-F238E27FC236}">
+              <a16:creationId xmlns:a16="http://schemas.microsoft.com/office/drawing/2014/main" id="{36AACE61-1FD6-E6C2-212C-BE6918846B69}"/>
+            </a:ext>
+          </a:extLst>
+        </p:cNvPr>
+        <p:cNvGrpSpPr/>
+        <p:nvPr/>
+      </p:nvGrpSpPr>
+      <p:grpSpPr>
+        <a:xfrm>
+          <a:off x="0" y="0"/>
+          <a:ext cx="0" cy="0"/>
+          <a:chOff x="0" y="0"/>
+          <a:chExt cx="0" cy="0"/>
+        </a:xfrm>
+      </p:grpSpPr>
+      <p:sp>
+        <p:nvSpPr>
+          <p:cNvPr id="2" name="Nadpis 1">
+            <a:extLst>
+              <a:ext uri="{FF2B5EF4-FFF2-40B4-BE49-F238E27FC236}">
+                <a16:creationId xmlns:a16="http://schemas.microsoft.com/office/drawing/2014/main" id="{0030540E-28B0-6697-F10C-A6082A45F8E6}"/>
+              </a:ext>
+            </a:extLst>
+          </p:cNvPr>
+          <p:cNvSpPr>
+            <a:spLocks noGrp="1"/>
+          </p:cNvSpPr>
+          <p:nvPr>
+            <p:ph type="title"/>
+          </p:nvPr>
+        </p:nvSpPr>
+        <p:spPr>
+          <a:xfrm>
+            <a:off x="473503" y="163295"/>
+            <a:ext cx="10515600" cy="1325563"/>
+          </a:xfrm>
+        </p:spPr>
+        <p:txBody>
+          <a:bodyPr/>
+          <a:lstStyle/>
+          <a:p>
+            <a:r>
+              <a:rPr lang="cs-CZ" b="1" dirty="0">
+                <a:solidFill>
+                  <a:schemeClr val="tx2">
+                    <a:lumMod val="90000"/>
+                    <a:lumOff val="10000"/>
+                  </a:schemeClr>
+                </a:solidFill>
+                <a:latin typeface="Helvetica Neue" panose="02000503000000020004" pitchFamily="2" charset="0"/>
+                <a:ea typeface="Helvetica Neue" panose="02000503000000020004" pitchFamily="2" charset="0"/>
+                <a:cs typeface="Helvetica Neue" panose="02000503000000020004" pitchFamily="2" charset="0"/>
+              </a:rPr>
+              <a:t>Cíle práce</a:t>
+            </a:r>
+          </a:p>
+        </p:txBody>
+      </p:sp>
+      <p:sp>
+        <p:nvSpPr>
+          <p:cNvPr id="3" name="Zástupný obsah 2">
+            <a:extLst>
+              <a:ext uri="{FF2B5EF4-FFF2-40B4-BE49-F238E27FC236}">
+                <a16:creationId xmlns:a16="http://schemas.microsoft.com/office/drawing/2014/main" id="{0DC4F4E2-22B0-9B4E-BF7C-48E8B33FCABC}"/>
+              </a:ext>
+            </a:extLst>
+          </p:cNvPr>
+          <p:cNvSpPr>
+            <a:spLocks noGrp="1"/>
+          </p:cNvSpPr>
+          <p:nvPr>
+            <p:ph idx="1"/>
+          </p:nvPr>
+        </p:nvSpPr>
+        <p:spPr>
+          <a:xfrm>
+            <a:off x="838200" y="1462289"/>
+            <a:ext cx="10515600" cy="4351338"/>
+          </a:xfrm>
+        </p:spPr>
+        <p:txBody>
+          <a:bodyPr>
+            <a:normAutofit/>
+          </a:bodyPr>
+          <a:lstStyle/>
+          <a:p>
+            <a:pPr marL="514350" indent="-514350">
+              <a:buFont typeface="+mj-lt"/>
+              <a:buAutoNum type="arabicPeriod"/>
+            </a:pPr>
+            <a:r>
+              <a:rPr lang="cs-CZ" sz="2000" b="1" dirty="0"/>
+              <a:t>Vyvinout aplikaci pro RHEED analýzu v reálném čase, která by byla nezávislá na výrobci systému RHEED nebo na kameře</a:t>
+            </a:r>
+          </a:p>
+          <a:p>
+            <a:pPr marL="514350" indent="-514350">
+              <a:buFont typeface="+mj-lt"/>
+              <a:buAutoNum type="arabicPeriod"/>
+            </a:pPr>
+            <a:r>
+              <a:rPr lang="cs-CZ" sz="2000" b="1" dirty="0"/>
+              <a:t>Přívětivé GUI</a:t>
+            </a:r>
+          </a:p>
+          <a:p>
+            <a:pPr marL="514350" indent="-514350">
+              <a:buFont typeface="+mj-lt"/>
+              <a:buAutoNum type="arabicPeriod"/>
+            </a:pPr>
+            <a:r>
+              <a:rPr lang="cs-CZ" sz="2000" b="1" dirty="0"/>
+              <a:t>Umožnit jednoduchou rozšiřitelnost aplikace </a:t>
+            </a:r>
+            <a:r>
+              <a:rPr lang="cs-CZ" sz="2000" dirty="0"/>
+              <a:t>=&gt; dobrá dokumentace kódu</a:t>
+            </a:r>
+          </a:p>
+          <a:p>
+            <a:pPr marL="514350" indent="-514350">
+              <a:buFont typeface="+mj-lt"/>
+              <a:buAutoNum type="arabicPeriod"/>
+            </a:pPr>
+            <a:endParaRPr lang="cs-CZ" sz="2000" dirty="0"/>
+          </a:p>
+          <a:p>
+            <a:pPr marL="514350" indent="-514350">
+              <a:buFont typeface="+mj-lt"/>
+              <a:buAutoNum type="arabicPeriod"/>
+            </a:pPr>
+            <a:endParaRPr lang="cs-CZ" sz="2000" dirty="0"/>
+          </a:p>
+          <a:p>
+            <a:pPr marL="514350" indent="-514350">
+              <a:buFont typeface="+mj-lt"/>
+              <a:buAutoNum type="arabicPeriod"/>
+            </a:pPr>
+            <a:endParaRPr lang="cs-CZ" sz="2000" dirty="0"/>
+          </a:p>
+          <a:p>
+            <a:pPr marL="514350" indent="-514350">
+              <a:buFont typeface="+mj-lt"/>
+              <a:buAutoNum type="arabicPeriod"/>
+            </a:pPr>
+            <a:endParaRPr lang="cs-CZ" sz="2000" dirty="0"/>
+          </a:p>
+          <a:p>
+            <a:pPr marL="514350" indent="-514350">
+              <a:buFont typeface="+mj-lt"/>
+              <a:buAutoNum type="arabicPeriod"/>
+            </a:pPr>
+            <a:endParaRPr lang="cs-CZ" sz="2000" dirty="0"/>
+          </a:p>
+          <a:p>
+            <a:pPr marL="514350" indent="-514350">
+              <a:buFont typeface="+mj-lt"/>
+              <a:buAutoNum type="arabicPeriod"/>
+            </a:pPr>
+            <a:endParaRPr lang="cs-CZ" sz="2000" dirty="0"/>
+          </a:p>
+          <a:p>
+            <a:pPr marL="0" indent="0">
+              <a:buNone/>
+            </a:pPr>
+            <a:r>
+              <a:rPr lang="cs-CZ" sz="2000" dirty="0"/>
+              <a:t>Většinu požadavků monitorujeme skrze </a:t>
+            </a:r>
+            <a:r>
+              <a:rPr lang="cs-CZ" sz="2000" b="1" dirty="0" err="1"/>
+              <a:t>issues</a:t>
+            </a:r>
+            <a:r>
+              <a:rPr lang="cs-CZ" sz="2000" dirty="0"/>
+              <a:t> v GitHub </a:t>
+            </a:r>
+            <a:r>
+              <a:rPr lang="cs-CZ" sz="2000" dirty="0" err="1"/>
+              <a:t>repozitáři</a:t>
+            </a:r>
+            <a:endParaRPr lang="cs-CZ" sz="2000" dirty="0"/>
+          </a:p>
+        </p:txBody>
+      </p:sp>
+      <p:pic>
+        <p:nvPicPr>
+          <p:cNvPr id="5" name="Picture 8" descr="Fyzikální ústav AV ČR, v.v.i. | Přehled institucí | Transfera.cz">
+            <a:extLst>
+              <a:ext uri="{FF2B5EF4-FFF2-40B4-BE49-F238E27FC236}">
+                <a16:creationId xmlns:a16="http://schemas.microsoft.com/office/drawing/2014/main" id="{CA78B188-3EDB-505C-F56F-ED8C2C574670}"/>
+              </a:ext>
+            </a:extLst>
+          </p:cNvPr>
+          <p:cNvPicPr>
+            <a:picLocks noChangeAspect="1" noChangeArrowheads="1"/>
+          </p:cNvPicPr>
+          <p:nvPr/>
+        </p:nvPicPr>
+        <p:blipFill>
+          <a:blip r:embed="rId2">
+            <a:extLst>
+              <a:ext uri="{28A0092B-C50C-407E-A947-70E740481C1C}">
+                <a14:useLocalDpi xmlns:a14="http://schemas.microsoft.com/office/drawing/2010/main" val="0"/>
+              </a:ext>
+            </a:extLst>
+          </a:blip>
+          <a:srcRect/>
+          <a:stretch>
+            <a:fillRect/>
+          </a:stretch>
+        </p:blipFill>
+        <p:spPr bwMode="auto">
+          <a:xfrm>
+            <a:off x="268965" y="5973827"/>
+            <a:ext cx="2329009" cy="592909"/>
+          </a:xfrm>
+          <a:prstGeom prst="rect">
+            <a:avLst/>
+          </a:prstGeom>
+          <a:noFill/>
+          <a:extLst>
+            <a:ext uri="{909E8E84-426E-40DD-AFC4-6F175D3DCCD1}">
+              <a14:hiddenFill xmlns:a14="http://schemas.microsoft.com/office/drawing/2010/main">
+                <a:solidFill>
+                  <a:srgbClr val="FFFFFF"/>
+                </a:solidFill>
+              </a14:hiddenFill>
+            </a:ext>
+          </a:extLst>
+        </p:spPr>
+      </p:pic>
+      <p:sp>
+        <p:nvSpPr>
+          <p:cNvPr id="6" name="Zástupný symbol pro číslo snímku 5">
+            <a:extLst>
+              <a:ext uri="{FF2B5EF4-FFF2-40B4-BE49-F238E27FC236}">
+                <a16:creationId xmlns:a16="http://schemas.microsoft.com/office/drawing/2014/main" id="{E223E3FB-CB8A-3B34-0878-139C622D2092}"/>
+              </a:ext>
+            </a:extLst>
+          </p:cNvPr>
+          <p:cNvSpPr>
+            <a:spLocks noGrp="1"/>
+          </p:cNvSpPr>
+          <p:nvPr>
+            <p:ph type="sldNum" sz="quarter" idx="12"/>
+          </p:nvPr>
+        </p:nvSpPr>
+        <p:spPr>
+          <a:xfrm>
+            <a:off x="9059518" y="6259095"/>
+            <a:ext cx="2743200" cy="365125"/>
+          </a:xfrm>
+        </p:spPr>
+        <p:txBody>
+          <a:bodyPr/>
+          <a:lstStyle/>
+          <a:p>
+            <a:fld id="{DA6B2738-7FCF-B04D-A8FF-72053771C37B}" type="slidenum">
+              <a:rPr lang="cs-CZ" sz="1400" b="1" smtClean="0">
+                <a:solidFill>
+                  <a:schemeClr val="accent4">
+                    <a:lumMod val="50000"/>
+                  </a:schemeClr>
+                </a:solidFill>
+                <a:latin typeface="Helvetica Neue" panose="02000503000000020004" pitchFamily="2" charset="0"/>
+                <a:ea typeface="Helvetica Neue" panose="02000503000000020004" pitchFamily="2" charset="0"/>
+                <a:cs typeface="Helvetica Neue" panose="02000503000000020004" pitchFamily="2" charset="0"/>
+              </a:rPr>
+              <a:t>8</a:t>
+            </a:fld>
+            <a:endParaRPr lang="cs-CZ" sz="1400" b="1" dirty="0">
+              <a:solidFill>
+                <a:schemeClr val="accent4">
+                  <a:lumMod val="50000"/>
+                </a:schemeClr>
+              </a:solidFill>
+              <a:latin typeface="Helvetica Neue" panose="02000503000000020004" pitchFamily="2" charset="0"/>
+              <a:ea typeface="Helvetica Neue" panose="02000503000000020004" pitchFamily="2" charset="0"/>
+              <a:cs typeface="Helvetica Neue" panose="02000503000000020004" pitchFamily="2" charset="0"/>
+            </a:endParaRPr>
+          </a:p>
+        </p:txBody>
+      </p:sp>
+    </p:spTree>
+    <p:extLst>
+      <p:ext uri="{BB962C8B-B14F-4D97-AF65-F5344CB8AC3E}">
+        <p14:creationId xmlns:p14="http://schemas.microsoft.com/office/powerpoint/2010/main" val="1693630378"/>
       </p:ext>
     </p:extLst>
   </p:cSld>

</xml_diff>

<commit_message>
edit presentation add a screenshot
</commit_message>
<xml_diff>
--- a/docs/presentation_9-4/rocnikovy_projekt_RHEED_prezentace.pptx
+++ b/docs/presentation_9-4/rocnikovy_projekt_RHEED_prezentace.pptx
@@ -208,7 +208,7 @@
           <a:p>
             <a:fld id="{5C63C553-C569-1445-AD9C-87FB6F1E0D78}" type="datetimeFigureOut">
               <a:rPr lang="cs-CZ" smtClean="0"/>
-              <a:t>09.04.2025</a:t>
+              <a:t>10.04.2025</a:t>
             </a:fld>
             <a:endParaRPr lang="cs-CZ"/>
           </a:p>
@@ -1012,7 +1012,7 @@
           <a:p>
             <a:fld id="{E8947BBA-447E-E342-BB19-A49552D04E7F}" type="datetime1">
               <a:rPr lang="cs-CZ" smtClean="0"/>
-              <a:t>09.04.2025</a:t>
+              <a:t>10.04.2025</a:t>
             </a:fld>
             <a:endParaRPr lang="cs-CZ"/>
           </a:p>
@@ -1210,7 +1210,7 @@
           <a:p>
             <a:fld id="{1B840879-0946-8A44-852E-8FAFB303ECFC}" type="datetime1">
               <a:rPr lang="cs-CZ" smtClean="0"/>
-              <a:t>09.04.2025</a:t>
+              <a:t>10.04.2025</a:t>
             </a:fld>
             <a:endParaRPr lang="cs-CZ"/>
           </a:p>
@@ -1418,7 +1418,7 @@
           <a:p>
             <a:fld id="{883B2BD5-60AC-514F-9802-8A82DE402746}" type="datetime1">
               <a:rPr lang="cs-CZ" smtClean="0"/>
-              <a:t>09.04.2025</a:t>
+              <a:t>10.04.2025</a:t>
             </a:fld>
             <a:endParaRPr lang="cs-CZ"/>
           </a:p>
@@ -1616,7 +1616,7 @@
           <a:p>
             <a:fld id="{F75ADF72-EDCB-5F46-B9A9-CD8A64D4C070}" type="datetime1">
               <a:rPr lang="cs-CZ" smtClean="0"/>
-              <a:t>09.04.2025</a:t>
+              <a:t>10.04.2025</a:t>
             </a:fld>
             <a:endParaRPr lang="cs-CZ"/>
           </a:p>
@@ -1891,7 +1891,7 @@
           <a:p>
             <a:fld id="{16A59DE4-4193-3A48-BC52-EE4A0773B70F}" type="datetime1">
               <a:rPr lang="cs-CZ" smtClean="0"/>
-              <a:t>09.04.2025</a:t>
+              <a:t>10.04.2025</a:t>
             </a:fld>
             <a:endParaRPr lang="cs-CZ"/>
           </a:p>
@@ -2156,7 +2156,7 @@
           <a:p>
             <a:fld id="{4A031237-053C-9F48-8C4E-4D915F2D3EC7}" type="datetime1">
               <a:rPr lang="cs-CZ" smtClean="0"/>
-              <a:t>09.04.2025</a:t>
+              <a:t>10.04.2025</a:t>
             </a:fld>
             <a:endParaRPr lang="cs-CZ"/>
           </a:p>
@@ -2568,7 +2568,7 @@
           <a:p>
             <a:fld id="{3D75ED5F-274F-8D4B-818B-A3D342587D00}" type="datetime1">
               <a:rPr lang="cs-CZ" smtClean="0"/>
-              <a:t>09.04.2025</a:t>
+              <a:t>10.04.2025</a:t>
             </a:fld>
             <a:endParaRPr lang="cs-CZ"/>
           </a:p>
@@ -2709,7 +2709,7 @@
           <a:p>
             <a:fld id="{2052841A-0750-304E-8211-AE58C8ED694E}" type="datetime1">
               <a:rPr lang="cs-CZ" smtClean="0"/>
-              <a:t>09.04.2025</a:t>
+              <a:t>10.04.2025</a:t>
             </a:fld>
             <a:endParaRPr lang="cs-CZ"/>
           </a:p>
@@ -2822,7 +2822,7 @@
           <a:p>
             <a:fld id="{158784A0-99E7-CC40-8925-43ED15BA0385}" type="datetime1">
               <a:rPr lang="cs-CZ" smtClean="0"/>
-              <a:t>09.04.2025</a:t>
+              <a:t>10.04.2025</a:t>
             </a:fld>
             <a:endParaRPr lang="cs-CZ"/>
           </a:p>
@@ -3133,7 +3133,7 @@
           <a:p>
             <a:fld id="{A5D7F37C-F3B7-964B-9106-442C783BBE1C}" type="datetime1">
               <a:rPr lang="cs-CZ" smtClean="0"/>
-              <a:t>09.04.2025</a:t>
+              <a:t>10.04.2025</a:t>
             </a:fld>
             <a:endParaRPr lang="cs-CZ"/>
           </a:p>
@@ -3421,7 +3421,7 @@
           <a:p>
             <a:fld id="{BE5E302E-02B3-E546-8E6C-41748F25A694}" type="datetime1">
               <a:rPr lang="cs-CZ" smtClean="0"/>
-              <a:t>09.04.2025</a:t>
+              <a:t>10.04.2025</a:t>
             </a:fld>
             <a:endParaRPr lang="cs-CZ"/>
           </a:p>
@@ -3662,7 +3662,7 @@
           <a:p>
             <a:fld id="{6ACDA20D-C940-B44F-B944-EFC8D8A6478D}" type="datetime1">
               <a:rPr lang="cs-CZ" smtClean="0"/>
-              <a:t>09.04.2025</a:t>
+              <a:t>10.04.2025</a:t>
             </a:fld>
             <a:endParaRPr lang="cs-CZ"/>
           </a:p>
@@ -6493,7 +6493,7 @@
         <p:spPr>
           <a:xfrm>
             <a:off x="838200" y="1462289"/>
-            <a:ext cx="10515600" cy="4351338"/>
+            <a:ext cx="9624237" cy="4351338"/>
           </a:xfrm>
         </p:spPr>
         <p:txBody>

</xml_diff>